<commit_message>
sorting, filtering, presentation update, speech
</commit_message>
<xml_diff>
--- a/Presentation.pptx
+++ b/Presentation.pptx
@@ -197,7 +197,7 @@
           <a:p>
             <a:fld id="{0A9F48B1-00C0-4311-9A7D-7B7CC51AAB2E}" type="datetimeFigureOut">
               <a:rPr lang="ru-RU" smtClean="0"/>
-              <a:t>19.09.2012</a:t>
+              <a:t>22.09.2012</a:t>
             </a:fld>
             <a:endParaRPr lang="ru-RU"/>
           </a:p>
@@ -730,7 +730,7 @@
           <a:p>
             <a:fld id="{97F5B43B-569E-478F-BABF-CC503FF173B5}" type="datetimeFigureOut">
               <a:rPr lang="ru-RU" smtClean="0"/>
-              <a:t>19.09.2012</a:t>
+              <a:t>22.09.2012</a:t>
             </a:fld>
             <a:endParaRPr lang="ru-RU"/>
           </a:p>
@@ -900,7 +900,7 @@
           <a:p>
             <a:fld id="{97F5B43B-569E-478F-BABF-CC503FF173B5}" type="datetimeFigureOut">
               <a:rPr lang="ru-RU" smtClean="0"/>
-              <a:t>19.09.2012</a:t>
+              <a:t>22.09.2012</a:t>
             </a:fld>
             <a:endParaRPr lang="ru-RU"/>
           </a:p>
@@ -1080,7 +1080,7 @@
           <a:p>
             <a:fld id="{97F5B43B-569E-478F-BABF-CC503FF173B5}" type="datetimeFigureOut">
               <a:rPr lang="ru-RU" smtClean="0"/>
-              <a:t>19.09.2012</a:t>
+              <a:t>22.09.2012</a:t>
             </a:fld>
             <a:endParaRPr lang="ru-RU"/>
           </a:p>
@@ -1250,7 +1250,7 @@
           <a:p>
             <a:fld id="{97F5B43B-569E-478F-BABF-CC503FF173B5}" type="datetimeFigureOut">
               <a:rPr lang="ru-RU" smtClean="0"/>
-              <a:t>19.09.2012</a:t>
+              <a:t>22.09.2012</a:t>
             </a:fld>
             <a:endParaRPr lang="ru-RU"/>
           </a:p>
@@ -1496,7 +1496,7 @@
           <a:p>
             <a:fld id="{97F5B43B-569E-478F-BABF-CC503FF173B5}" type="datetimeFigureOut">
               <a:rPr lang="ru-RU" smtClean="0"/>
-              <a:t>19.09.2012</a:t>
+              <a:t>22.09.2012</a:t>
             </a:fld>
             <a:endParaRPr lang="ru-RU"/>
           </a:p>
@@ -1784,7 +1784,7 @@
           <a:p>
             <a:fld id="{97F5B43B-569E-478F-BABF-CC503FF173B5}" type="datetimeFigureOut">
               <a:rPr lang="ru-RU" smtClean="0"/>
-              <a:t>19.09.2012</a:t>
+              <a:t>22.09.2012</a:t>
             </a:fld>
             <a:endParaRPr lang="ru-RU"/>
           </a:p>
@@ -2206,7 +2206,7 @@
           <a:p>
             <a:fld id="{97F5B43B-569E-478F-BABF-CC503FF173B5}" type="datetimeFigureOut">
               <a:rPr lang="ru-RU" smtClean="0"/>
-              <a:t>19.09.2012</a:t>
+              <a:t>22.09.2012</a:t>
             </a:fld>
             <a:endParaRPr lang="ru-RU"/>
           </a:p>
@@ -2324,7 +2324,7 @@
           <a:p>
             <a:fld id="{97F5B43B-569E-478F-BABF-CC503FF173B5}" type="datetimeFigureOut">
               <a:rPr lang="ru-RU" smtClean="0"/>
-              <a:t>19.09.2012</a:t>
+              <a:t>22.09.2012</a:t>
             </a:fld>
             <a:endParaRPr lang="ru-RU"/>
           </a:p>
@@ -2419,7 +2419,7 @@
           <a:p>
             <a:fld id="{97F5B43B-569E-478F-BABF-CC503FF173B5}" type="datetimeFigureOut">
               <a:rPr lang="ru-RU" smtClean="0"/>
-              <a:t>19.09.2012</a:t>
+              <a:t>22.09.2012</a:t>
             </a:fld>
             <a:endParaRPr lang="ru-RU"/>
           </a:p>
@@ -2696,7 +2696,7 @@
           <a:p>
             <a:fld id="{97F5B43B-569E-478F-BABF-CC503FF173B5}" type="datetimeFigureOut">
               <a:rPr lang="ru-RU" smtClean="0"/>
-              <a:t>19.09.2012</a:t>
+              <a:t>22.09.2012</a:t>
             </a:fld>
             <a:endParaRPr lang="ru-RU"/>
           </a:p>
@@ -2949,7 +2949,7 @@
           <a:p>
             <a:fld id="{97F5B43B-569E-478F-BABF-CC503FF173B5}" type="datetimeFigureOut">
               <a:rPr lang="ru-RU" smtClean="0"/>
-              <a:t>19.09.2012</a:t>
+              <a:t>22.09.2012</a:t>
             </a:fld>
             <a:endParaRPr lang="ru-RU"/>
           </a:p>
@@ -3162,7 +3162,7 @@
           <a:p>
             <a:fld id="{97F5B43B-569E-478F-BABF-CC503FF173B5}" type="datetimeFigureOut">
               <a:rPr lang="ru-RU" smtClean="0"/>
-              <a:t>19.09.2012</a:t>
+              <a:t>22.09.2012</a:t>
             </a:fld>
             <a:endParaRPr lang="ru-RU"/>
           </a:p>
@@ -3883,8 +3883,8 @@
         </p:blipFill>
         <p:spPr>
           <a:xfrm>
-            <a:off x="0" y="4514097"/>
-            <a:ext cx="9144000" cy="2443295"/>
+            <a:off x="0" y="4221088"/>
+            <a:ext cx="9144000" cy="2736305"/>
           </a:xfrm>
           <a:prstGeom prst="rect">
             <a:avLst/>
@@ -3911,7 +3911,7 @@
                 <a:latin typeface="Arial" pitchFamily="34" charset="0"/>
                 <a:cs typeface="Arial" pitchFamily="34" charset="0"/>
               </a:rPr>
-              <a:t>Выбор темы</a:t>
+              <a:t>Тема</a:t>
             </a:r>
             <a:endParaRPr lang="ru-RU" dirty="0">
               <a:latin typeface="Arial" pitchFamily="34" charset="0"/>
@@ -3940,48 +3940,24 @@
           <a:bodyPr/>
           <a:lstStyle/>
           <a:p>
+            <a:pPr marL="0" indent="0">
+              <a:buNone/>
+            </a:pPr>
+            <a:endParaRPr lang="ru-RU" dirty="0" smtClean="0">
+              <a:latin typeface="Arial" pitchFamily="34" charset="0"/>
+              <a:cs typeface="Arial" pitchFamily="34" charset="0"/>
+            </a:endParaRPr>
+          </a:p>
+          <a:p>
+            <a:pPr marL="0" indent="0">
+              <a:buNone/>
+            </a:pPr>
             <a:r>
               <a:rPr lang="ru-RU" dirty="0" smtClean="0">
                 <a:latin typeface="Arial" pitchFamily="34" charset="0"/>
                 <a:cs typeface="Arial" pitchFamily="34" charset="0"/>
               </a:rPr>
-              <a:t>Интерес к теме</a:t>
-            </a:r>
-          </a:p>
-          <a:p>
-            <a:r>
-              <a:rPr lang="ru-RU" dirty="0" smtClean="0">
-                <a:latin typeface="Arial" pitchFamily="34" charset="0"/>
-                <a:cs typeface="Arial" pitchFamily="34" charset="0"/>
-              </a:rPr>
-              <a:t>Популярность темы (трафик)</a:t>
-            </a:r>
-          </a:p>
-          <a:p>
-            <a:r>
-              <a:rPr lang="ru-RU" dirty="0" smtClean="0">
-                <a:latin typeface="Arial" pitchFamily="34" charset="0"/>
-                <a:cs typeface="Arial" pitchFamily="34" charset="0"/>
-              </a:rPr>
-              <a:t>Конкуренция</a:t>
-            </a:r>
-          </a:p>
-          <a:p>
-            <a:r>
-              <a:rPr lang="ru-RU" dirty="0" smtClean="0">
-                <a:latin typeface="Arial" pitchFamily="34" charset="0"/>
-                <a:cs typeface="Arial" pitchFamily="34" charset="0"/>
-              </a:rPr>
-              <a:t>Прибыльность	</a:t>
-            </a:r>
-          </a:p>
-          <a:p>
-            <a:r>
-              <a:rPr lang="ru-RU" dirty="0" smtClean="0">
-                <a:latin typeface="Arial" pitchFamily="34" charset="0"/>
-                <a:cs typeface="Arial" pitchFamily="34" charset="0"/>
-              </a:rPr>
-              <a:t>Актуальность</a:t>
+              <a:t>Веб-приложение, посвященное размещению объявлений о покупке, продаже и аренде недвижимости.</a:t>
             </a:r>
             <a:endParaRPr lang="ru-RU" dirty="0" smtClean="0">
               <a:latin typeface="Arial" pitchFamily="34" charset="0"/>
@@ -4401,10 +4377,6 @@
               </a:rPr>
               <a:t>Валидация вводимых данных</a:t>
             </a:r>
-            <a:endParaRPr lang="ru-RU" sz="2800" dirty="0" smtClean="0">
-              <a:latin typeface="Arial" pitchFamily="34" charset="0"/>
-              <a:cs typeface="Arial" pitchFamily="34" charset="0"/>
-            </a:endParaRPr>
           </a:p>
         </p:txBody>
       </p:sp>

</xml_diff>

<commit_message>
update database diagram and presentation
</commit_message>
<xml_diff>
--- a/Presentation.pptx
+++ b/Presentation.pptx
@@ -197,7 +197,7 @@
           <a:p>
             <a:fld id="{0A9F48B1-00C0-4311-9A7D-7B7CC51AAB2E}" type="datetimeFigureOut">
               <a:rPr lang="ru-RU" smtClean="0"/>
-              <a:t>24.09.2012</a:t>
+              <a:t>26.09.2012</a:t>
             </a:fld>
             <a:endParaRPr lang="ru-RU"/>
           </a:p>
@@ -730,7 +730,7 @@
           <a:p>
             <a:fld id="{97F5B43B-569E-478F-BABF-CC503FF173B5}" type="datetimeFigureOut">
               <a:rPr lang="ru-RU" smtClean="0"/>
-              <a:t>24.09.2012</a:t>
+              <a:t>26.09.2012</a:t>
             </a:fld>
             <a:endParaRPr lang="ru-RU"/>
           </a:p>
@@ -900,7 +900,7 @@
           <a:p>
             <a:fld id="{97F5B43B-569E-478F-BABF-CC503FF173B5}" type="datetimeFigureOut">
               <a:rPr lang="ru-RU" smtClean="0"/>
-              <a:t>24.09.2012</a:t>
+              <a:t>26.09.2012</a:t>
             </a:fld>
             <a:endParaRPr lang="ru-RU"/>
           </a:p>
@@ -1080,7 +1080,7 @@
           <a:p>
             <a:fld id="{97F5B43B-569E-478F-BABF-CC503FF173B5}" type="datetimeFigureOut">
               <a:rPr lang="ru-RU" smtClean="0"/>
-              <a:t>24.09.2012</a:t>
+              <a:t>26.09.2012</a:t>
             </a:fld>
             <a:endParaRPr lang="ru-RU"/>
           </a:p>
@@ -1250,7 +1250,7 @@
           <a:p>
             <a:fld id="{97F5B43B-569E-478F-BABF-CC503FF173B5}" type="datetimeFigureOut">
               <a:rPr lang="ru-RU" smtClean="0"/>
-              <a:t>24.09.2012</a:t>
+              <a:t>26.09.2012</a:t>
             </a:fld>
             <a:endParaRPr lang="ru-RU"/>
           </a:p>
@@ -1496,7 +1496,7 @@
           <a:p>
             <a:fld id="{97F5B43B-569E-478F-BABF-CC503FF173B5}" type="datetimeFigureOut">
               <a:rPr lang="ru-RU" smtClean="0"/>
-              <a:t>24.09.2012</a:t>
+              <a:t>26.09.2012</a:t>
             </a:fld>
             <a:endParaRPr lang="ru-RU"/>
           </a:p>
@@ -1784,7 +1784,7 @@
           <a:p>
             <a:fld id="{97F5B43B-569E-478F-BABF-CC503FF173B5}" type="datetimeFigureOut">
               <a:rPr lang="ru-RU" smtClean="0"/>
-              <a:t>24.09.2012</a:t>
+              <a:t>26.09.2012</a:t>
             </a:fld>
             <a:endParaRPr lang="ru-RU"/>
           </a:p>
@@ -2206,7 +2206,7 @@
           <a:p>
             <a:fld id="{97F5B43B-569E-478F-BABF-CC503FF173B5}" type="datetimeFigureOut">
               <a:rPr lang="ru-RU" smtClean="0"/>
-              <a:t>24.09.2012</a:t>
+              <a:t>26.09.2012</a:t>
             </a:fld>
             <a:endParaRPr lang="ru-RU"/>
           </a:p>
@@ -2324,7 +2324,7 @@
           <a:p>
             <a:fld id="{97F5B43B-569E-478F-BABF-CC503FF173B5}" type="datetimeFigureOut">
               <a:rPr lang="ru-RU" smtClean="0"/>
-              <a:t>24.09.2012</a:t>
+              <a:t>26.09.2012</a:t>
             </a:fld>
             <a:endParaRPr lang="ru-RU"/>
           </a:p>
@@ -2419,7 +2419,7 @@
           <a:p>
             <a:fld id="{97F5B43B-569E-478F-BABF-CC503FF173B5}" type="datetimeFigureOut">
               <a:rPr lang="ru-RU" smtClean="0"/>
-              <a:t>24.09.2012</a:t>
+              <a:t>26.09.2012</a:t>
             </a:fld>
             <a:endParaRPr lang="ru-RU"/>
           </a:p>
@@ -2696,7 +2696,7 @@
           <a:p>
             <a:fld id="{97F5B43B-569E-478F-BABF-CC503FF173B5}" type="datetimeFigureOut">
               <a:rPr lang="ru-RU" smtClean="0"/>
-              <a:t>24.09.2012</a:t>
+              <a:t>26.09.2012</a:t>
             </a:fld>
             <a:endParaRPr lang="ru-RU"/>
           </a:p>
@@ -2949,7 +2949,7 @@
           <a:p>
             <a:fld id="{97F5B43B-569E-478F-BABF-CC503FF173B5}" type="datetimeFigureOut">
               <a:rPr lang="ru-RU" smtClean="0"/>
-              <a:t>24.09.2012</a:t>
+              <a:t>26.09.2012</a:t>
             </a:fld>
             <a:endParaRPr lang="ru-RU"/>
           </a:p>
@@ -3162,7 +3162,7 @@
           <a:p>
             <a:fld id="{97F5B43B-569E-478F-BABF-CC503FF173B5}" type="datetimeFigureOut">
               <a:rPr lang="ru-RU" smtClean="0"/>
-              <a:t>24.09.2012</a:t>
+              <a:t>26.09.2012</a:t>
             </a:fld>
             <a:endParaRPr lang="ru-RU"/>
           </a:p>
@@ -5027,7 +5027,7 @@
         </p:blipFill>
         <p:spPr bwMode="auto">
           <a:xfrm>
-            <a:off x="971600" y="1203958"/>
+            <a:off x="899592" y="1079593"/>
             <a:ext cx="7323435" cy="5393394"/>
           </a:xfrm>
           <a:prstGeom prst="rect">
@@ -5120,8 +5120,38 @@
         </p:blipFill>
         <p:spPr>
           <a:xfrm>
-            <a:off x="0" y="4514097"/>
-            <a:ext cx="9144000" cy="2343903"/>
+            <a:off x="0" y="5733256"/>
+            <a:ext cx="9144000" cy="1124745"/>
+          </a:xfrm>
+          <a:prstGeom prst="rect">
+            <a:avLst/>
+          </a:prstGeom>
+        </p:spPr>
+      </p:pic>
+      <p:pic>
+        <p:nvPicPr>
+          <p:cNvPr id="8" name="Рисунок 7"/>
+          <p:cNvPicPr>
+            <a:picLocks noChangeAspect="1"/>
+          </p:cNvPicPr>
+          <p:nvPr/>
+        </p:nvPicPr>
+        <p:blipFill>
+          <a:blip r:embed="rId3">
+            <a:extLst>
+              <a:ext uri="{28A0092B-C50C-407E-A947-70E740481C1C}">
+                <a14:useLocalDpi xmlns:a14="http://schemas.microsoft.com/office/drawing/2010/main" val="0"/>
+              </a:ext>
+            </a:extLst>
+          </a:blip>
+          <a:stretch>
+            <a:fillRect/>
+          </a:stretch>
+        </p:blipFill>
+        <p:spPr>
+          <a:xfrm>
+            <a:off x="864491" y="1075942"/>
+            <a:ext cx="7235901" cy="4783925"/>
           </a:xfrm>
           <a:prstGeom prst="rect">
             <a:avLst/>
@@ -5171,7 +5201,7 @@
           <p:nvPr/>
         </p:nvPicPr>
         <p:blipFill>
-          <a:blip r:embed="rId3" cstate="print">
+          <a:blip r:embed="rId4" cstate="print">
             <a:extLst>
               <a:ext uri="{28A0092B-C50C-407E-A947-70E740481C1C}">
                 <a14:useLocalDpi xmlns:a14="http://schemas.microsoft.com/office/drawing/2010/main" val="0"/>
@@ -5201,7 +5231,7 @@
           <p:nvPr/>
         </p:nvPicPr>
         <p:blipFill>
-          <a:blip r:embed="rId4">
+          <a:blip r:embed="rId5">
             <a:extLst>
               <a:ext uri="{28A0092B-C50C-407E-A947-70E740481C1C}">
                 <a14:useLocalDpi xmlns:a14="http://schemas.microsoft.com/office/drawing/2010/main" val="0"/>
@@ -5216,36 +5246,6 @@
           <a:xfrm>
             <a:off x="7181546" y="404664"/>
             <a:ext cx="1566918" cy="522305"/>
-          </a:xfrm>
-          <a:prstGeom prst="rect">
-            <a:avLst/>
-          </a:prstGeom>
-        </p:spPr>
-      </p:pic>
-      <p:pic>
-        <p:nvPicPr>
-          <p:cNvPr id="15" name="Рисунок 14"/>
-          <p:cNvPicPr>
-            <a:picLocks noChangeAspect="1"/>
-          </p:cNvPicPr>
-          <p:nvPr/>
-        </p:nvPicPr>
-        <p:blipFill>
-          <a:blip r:embed="rId5">
-            <a:extLst>
-              <a:ext uri="{28A0092B-C50C-407E-A947-70E740481C1C}">
-                <a14:useLocalDpi xmlns:a14="http://schemas.microsoft.com/office/drawing/2010/main" val="0"/>
-              </a:ext>
-            </a:extLst>
-          </a:blip>
-          <a:stretch>
-            <a:fillRect/>
-          </a:stretch>
-        </p:blipFill>
-        <p:spPr>
-          <a:xfrm>
-            <a:off x="1115616" y="1268760"/>
-            <a:ext cx="6551302" cy="4536504"/>
           </a:xfrm>
           <a:prstGeom prst="rect">
             <a:avLst/>

</xml_diff>